<commit_message>
add tutor page, fix lecs
</commit_message>
<xml_diff>
--- a/dapr3_lectures/dapr3_lmer_lec/img_sandbox/confusion.pptx
+++ b/dapr3_lectures/dapr3_lmer_lec/img_sandbox/confusion.pptx
@@ -104,7 +104,23 @@
       </a:defRPr>
     </a:lvl9pPr>
   </p:defaultTextStyle>
+  <p:extLst>
+    <p:ext uri="{EFAFB233-063F-42B5-8137-9DF3F51BA10A}">
+      <p15:sldGuideLst xmlns:p15="http://schemas.microsoft.com/office/powerpoint/2012/main"/>
+    </p:ext>
+  </p:extLst>
 </p:presentation>
+</file>
+
+<file path=ppt/revisionInfo.xml><?xml version="1.0" encoding="utf-8"?>
+<p1510:revInfo xmlns:a="http://schemas.openxmlformats.org/drawingml/2006/main" xmlns:r="http://schemas.openxmlformats.org/officeDocument/2006/relationships" xmlns:p1510="http://schemas.microsoft.com/office/powerpoint/2015/10/main">
+  <p1510:revLst>
+    <p1510:client id="{3F185702-E77B-4739-9F89-6EF82F0E93CF}" v="91" dt="2025-09-02T14:36:27.912"/>
+    <p1510:client id="{89D29625-71C2-6BC3-06CE-798BD888539F}" v="59" dt="2025-09-02T14:30:06.493"/>
+    <p1510:client id="{977AC500-D6DD-4FBD-93C2-A326F9C230EA}" v="80" dt="2025-09-02T14:33:13.472"/>
+    <p1510:client id="{A32B096D-E3F7-4C92-95BD-718E4FEA1EDC}" v="10" dt="2025-09-02T14:33:56.281"/>
+  </p1510:revLst>
+</p1510:revInfo>
 </file>
 
 <file path=ppt/slideLayouts/slideLayout1.xml><?xml version="1.0" encoding="utf-8"?>
@@ -256,7 +272,7 @@
           <a:p>
             <a:fld id="{B336917C-24CF-4AE9-B288-FEFAEC8333F1}" type="datetimeFigureOut">
               <a:rPr lang="en-GB" smtClean="0"/>
-              <a:t>02/09/2025</a:t>
+              <a:t>15/09/2025</a:t>
             </a:fld>
             <a:endParaRPr lang="en-GB"/>
           </a:p>
@@ -456,7 +472,7 @@
           <a:p>
             <a:fld id="{B336917C-24CF-4AE9-B288-FEFAEC8333F1}" type="datetimeFigureOut">
               <a:rPr lang="en-GB" smtClean="0"/>
-              <a:t>02/09/2025</a:t>
+              <a:t>15/09/2025</a:t>
             </a:fld>
             <a:endParaRPr lang="en-GB"/>
           </a:p>
@@ -666,7 +682,7 @@
           <a:p>
             <a:fld id="{B336917C-24CF-4AE9-B288-FEFAEC8333F1}" type="datetimeFigureOut">
               <a:rPr lang="en-GB" smtClean="0"/>
-              <a:t>02/09/2025</a:t>
+              <a:t>15/09/2025</a:t>
             </a:fld>
             <a:endParaRPr lang="en-GB"/>
           </a:p>
@@ -866,7 +882,7 @@
           <a:p>
             <a:fld id="{B336917C-24CF-4AE9-B288-FEFAEC8333F1}" type="datetimeFigureOut">
               <a:rPr lang="en-GB" smtClean="0"/>
-              <a:t>02/09/2025</a:t>
+              <a:t>15/09/2025</a:t>
             </a:fld>
             <a:endParaRPr lang="en-GB"/>
           </a:p>
@@ -1142,7 +1158,7 @@
           <a:p>
             <a:fld id="{B336917C-24CF-4AE9-B288-FEFAEC8333F1}" type="datetimeFigureOut">
               <a:rPr lang="en-GB" smtClean="0"/>
-              <a:t>02/09/2025</a:t>
+              <a:t>15/09/2025</a:t>
             </a:fld>
             <a:endParaRPr lang="en-GB"/>
           </a:p>
@@ -1410,7 +1426,7 @@
           <a:p>
             <a:fld id="{B336917C-24CF-4AE9-B288-FEFAEC8333F1}" type="datetimeFigureOut">
               <a:rPr lang="en-GB" smtClean="0"/>
-              <a:t>02/09/2025</a:t>
+              <a:t>15/09/2025</a:t>
             </a:fld>
             <a:endParaRPr lang="en-GB"/>
           </a:p>
@@ -1825,7 +1841,7 @@
           <a:p>
             <a:fld id="{B336917C-24CF-4AE9-B288-FEFAEC8333F1}" type="datetimeFigureOut">
               <a:rPr lang="en-GB" smtClean="0"/>
-              <a:t>02/09/2025</a:t>
+              <a:t>15/09/2025</a:t>
             </a:fld>
             <a:endParaRPr lang="en-GB"/>
           </a:p>
@@ -1967,7 +1983,7 @@
           <a:p>
             <a:fld id="{B336917C-24CF-4AE9-B288-FEFAEC8333F1}" type="datetimeFigureOut">
               <a:rPr lang="en-GB" smtClean="0"/>
-              <a:t>02/09/2025</a:t>
+              <a:t>15/09/2025</a:t>
             </a:fld>
             <a:endParaRPr lang="en-GB"/>
           </a:p>
@@ -2080,7 +2096,7 @@
           <a:p>
             <a:fld id="{B336917C-24CF-4AE9-B288-FEFAEC8333F1}" type="datetimeFigureOut">
               <a:rPr lang="en-GB" smtClean="0"/>
-              <a:t>02/09/2025</a:t>
+              <a:t>15/09/2025</a:t>
             </a:fld>
             <a:endParaRPr lang="en-GB"/>
           </a:p>
@@ -2393,7 +2409,7 @@
           <a:p>
             <a:fld id="{B336917C-24CF-4AE9-B288-FEFAEC8333F1}" type="datetimeFigureOut">
               <a:rPr lang="en-GB" smtClean="0"/>
-              <a:t>02/09/2025</a:t>
+              <a:t>15/09/2025</a:t>
             </a:fld>
             <a:endParaRPr lang="en-GB"/>
           </a:p>
@@ -2682,7 +2698,7 @@
           <a:p>
             <a:fld id="{B336917C-24CF-4AE9-B288-FEFAEC8333F1}" type="datetimeFigureOut">
               <a:rPr lang="en-GB" smtClean="0"/>
-              <a:t>02/09/2025</a:t>
+              <a:t>15/09/2025</a:t>
             </a:fld>
             <a:endParaRPr lang="en-GB"/>
           </a:p>
@@ -2925,7 +2941,7 @@
           <a:p>
             <a:fld id="{B336917C-24CF-4AE9-B288-FEFAEC8333F1}" type="datetimeFigureOut">
               <a:rPr lang="en-GB" smtClean="0"/>
-              <a:t>02/09/2025</a:t>
+              <a:t>15/09/2025</a:t>
             </a:fld>
             <a:endParaRPr lang="en-GB"/>
           </a:p>
@@ -3371,7 +3387,7 @@
           <a:lstStyle/>
           <a:p>
             <a:r>
-              <a:rPr lang="en-GB" dirty="0"/>
+              <a:rPr lang="en-GB"/>
               <a:t>Confused?</a:t>
             </a:r>
           </a:p>
@@ -3391,8 +3407,8 @@
         </p:nvSpPr>
         <p:spPr>
           <a:xfrm>
-            <a:off x="6014763" y="51617"/>
-            <a:ext cx="5116657" cy="800219"/>
+            <a:off x="6043699" y="13035"/>
+            <a:ext cx="5386733" cy="800219"/>
           </a:xfrm>
           <a:prstGeom prst="rect">
             <a:avLst/>
@@ -3405,36 +3421,44 @@
           </a:ln>
         </p:spPr>
         <p:txBody>
-          <a:bodyPr wrap="square" rtlCol="0">
+          <a:bodyPr wrap="square" lIns="91440" tIns="45720" rIns="91440" bIns="45720" rtlCol="0" anchor="t">
             <a:spAutoFit/>
           </a:bodyPr>
           <a:lstStyle/>
           <a:p>
             <a:r>
-              <a:rPr lang="en-GB" b="1" dirty="0"/>
+              <a:rPr lang="en-GB" b="1"/>
               <a:t>You misheard</a:t>
             </a:r>
-            <a:endParaRPr lang="en-GB" dirty="0"/>
-          </a:p>
-          <a:p>
-            <a:pPr>
-              <a:buFont typeface="Arial" panose="020B0604020202020204" pitchFamily="34" charset="0"/>
-              <a:buChar char="•"/>
+            <a:endParaRPr lang="en-GB"/>
+          </a:p>
+          <a:p>
+            <a:pPr marL="285750" indent="-285750">
+              <a:buFont typeface="Wingdings" panose="020B0604020202020204" pitchFamily="34" charset="0"/>
+              <a:buChar char="Ø"/>
             </a:pPr>
             <a:r>
-              <a:rPr lang="en-GB" sz="1400" dirty="0"/>
-              <a:t>→ Lectures are boring. It’s hard to pay attention. Ask me to repeat</a:t>
-            </a:r>
-          </a:p>
-          <a:p>
-            <a:pPr>
-              <a:buFont typeface="Arial" panose="020B0604020202020204" pitchFamily="34" charset="0"/>
-              <a:buChar char="•"/>
+              <a:rPr lang="en-GB" sz="1400"/>
+              <a:t>Lectures can be boring. It’s hard to pay attention. Ask me to repeat</a:t>
+            </a:r>
+            <a:endParaRPr lang="en-GB" sz="1400">
+              <a:ea typeface="Calibri"/>
+              <a:cs typeface="Calibri"/>
+            </a:endParaRPr>
+          </a:p>
+          <a:p>
+            <a:pPr marL="285750" indent="-285750">
+              <a:buFont typeface="Wingdings" panose="020B0604020202020204" pitchFamily="34" charset="0"/>
+              <a:buChar char="Ø"/>
             </a:pPr>
             <a:r>
-              <a:rPr lang="en-GB" sz="1400" dirty="0"/>
-              <a:t>→ Ask your neighbour to check</a:t>
-            </a:r>
+              <a:rPr lang="en-GB" sz="1400"/>
+              <a:t>Ask your neighbour if they heard the same thing</a:t>
+            </a:r>
+            <a:endParaRPr lang="en-GB" sz="1400">
+              <a:ea typeface="Calibri"/>
+              <a:cs typeface="Calibri"/>
+            </a:endParaRPr>
           </a:p>
         </p:txBody>
       </p:sp>
@@ -3466,36 +3490,44 @@
           </a:ln>
         </p:spPr>
         <p:txBody>
-          <a:bodyPr wrap="square">
+          <a:bodyPr wrap="square" lIns="91440" tIns="45720" rIns="91440" bIns="45720" anchor="t">
             <a:spAutoFit/>
           </a:bodyPr>
           <a:lstStyle/>
           <a:p>
             <a:r>
-              <a:rPr lang="en-GB" b="1" dirty="0"/>
+              <a:rPr lang="en-GB" b="1"/>
               <a:t>I mis-spoke</a:t>
             </a:r>
-            <a:endParaRPr lang="en-GB" dirty="0"/>
-          </a:p>
-          <a:p>
-            <a:pPr>
-              <a:buFont typeface="Arial" panose="020B0604020202020204" pitchFamily="34" charset="0"/>
-              <a:buChar char="•"/>
+            <a:endParaRPr lang="en-GB"/>
+          </a:p>
+          <a:p>
+            <a:pPr marL="285750" indent="-285750">
+              <a:buFont typeface="Wingdings" panose="020B0604020202020204" pitchFamily="34" charset="0"/>
+              <a:buChar char="Ø"/>
             </a:pPr>
             <a:r>
-              <a:rPr lang="en-GB" sz="1400" dirty="0"/>
-              <a:t>→ Point it out (you’re helping me!)</a:t>
-            </a:r>
-          </a:p>
-          <a:p>
-            <a:pPr>
-              <a:buFont typeface="Arial" panose="020B0604020202020204" pitchFamily="34" charset="0"/>
-              <a:buChar char="•"/>
+              <a:rPr lang="en-GB" sz="1400"/>
+              <a:t> Point it out (you’re helping me!)</a:t>
+            </a:r>
+            <a:endParaRPr lang="en-GB" sz="1400">
+              <a:ea typeface="Calibri" panose="020F0502020204030204"/>
+              <a:cs typeface="Calibri" panose="020F0502020204030204"/>
+            </a:endParaRPr>
+          </a:p>
+          <a:p>
+            <a:pPr marL="285750" indent="-285750">
+              <a:buFont typeface="Wingdings" panose="020B0604020202020204" pitchFamily="34" charset="0"/>
+              <a:buChar char="Ø"/>
             </a:pPr>
             <a:r>
-              <a:rPr lang="en-GB" sz="1400" dirty="0"/>
-              <a:t>→ Others are probably confused too</a:t>
-            </a:r>
+              <a:rPr lang="en-GB" sz="1400"/>
+              <a:t> Others are probably confused too</a:t>
+            </a:r>
+            <a:endParaRPr lang="en-GB" sz="1400">
+              <a:ea typeface="Calibri" panose="020F0502020204030204"/>
+              <a:cs typeface="Calibri" panose="020F0502020204030204"/>
+            </a:endParaRPr>
           </a:p>
         </p:txBody>
       </p:sp>
@@ -3527,36 +3559,44 @@
           </a:ln>
         </p:spPr>
         <p:txBody>
-          <a:bodyPr wrap="square">
+          <a:bodyPr wrap="square" lIns="91440" tIns="45720" rIns="91440" bIns="45720" anchor="t">
             <a:spAutoFit/>
           </a:bodyPr>
           <a:lstStyle/>
           <a:p>
             <a:r>
-              <a:rPr lang="en-GB" b="1" dirty="0"/>
+              <a:rPr lang="en-GB" b="1"/>
               <a:t>It’s a new concept (definitely!)</a:t>
             </a:r>
-            <a:endParaRPr lang="en-GB" dirty="0"/>
-          </a:p>
-          <a:p>
-            <a:pPr>
-              <a:buFont typeface="Arial" panose="020B0604020202020204" pitchFamily="34" charset="0"/>
-              <a:buChar char="•"/>
+            <a:endParaRPr lang="en-GB"/>
+          </a:p>
+          <a:p>
+            <a:pPr marL="285750" indent="-285750">
+              <a:buFont typeface="Wingdings" panose="020B0604020202020204" pitchFamily="34" charset="0"/>
+              <a:buChar char="Ø"/>
             </a:pPr>
             <a:r>
-              <a:rPr lang="en-GB" sz="1400" dirty="0"/>
-              <a:t>→ Confusion is just thinking in progress. </a:t>
-            </a:r>
-          </a:p>
-          <a:p>
-            <a:pPr>
-              <a:buFont typeface="Arial" panose="020B0604020202020204" pitchFamily="34" charset="0"/>
-              <a:buChar char="•"/>
+              <a:rPr lang="en-GB" sz="1400"/>
+              <a:t> Confusion is just thinking in progress. </a:t>
+            </a:r>
+            <a:endParaRPr lang="en-GB" sz="1400">
+              <a:ea typeface="Calibri" panose="020F0502020204030204"/>
+              <a:cs typeface="Calibri" panose="020F0502020204030204"/>
+            </a:endParaRPr>
+          </a:p>
+          <a:p>
+            <a:pPr marL="285750" indent="-285750">
+              <a:buFont typeface="Wingdings" panose="020B0604020202020204" pitchFamily="34" charset="0"/>
+              <a:buChar char="Ø"/>
             </a:pPr>
             <a:r>
-              <a:rPr lang="en-GB" sz="1400" dirty="0"/>
-              <a:t>→ Perfect time to ask for clarification - chances are someone else has the same question</a:t>
-            </a:r>
+              <a:rPr lang="en-GB" sz="1400"/>
+              <a:t> Perfect time to ask for clarification - chances are someone else has the same question</a:t>
+            </a:r>
+            <a:endParaRPr lang="en-GB" sz="1400">
+              <a:ea typeface="Calibri" panose="020F0502020204030204"/>
+              <a:cs typeface="Calibri" panose="020F0502020204030204"/>
+            </a:endParaRPr>
           </a:p>
         </p:txBody>
       </p:sp>
@@ -3588,36 +3628,44 @@
           </a:ln>
         </p:spPr>
         <p:txBody>
-          <a:bodyPr wrap="square">
+          <a:bodyPr wrap="square" lIns="91440" tIns="45720" rIns="91440" bIns="45720" anchor="t">
             <a:spAutoFit/>
           </a:bodyPr>
           <a:lstStyle/>
           <a:p>
             <a:r>
-              <a:rPr lang="en-GB" b="1" dirty="0"/>
+              <a:rPr lang="en-GB" b="1"/>
               <a:t>I explained it too fast</a:t>
             </a:r>
-            <a:endParaRPr lang="en-GB" dirty="0"/>
-          </a:p>
-          <a:p>
-            <a:pPr>
-              <a:buFont typeface="Arial" panose="020B0604020202020204" pitchFamily="34" charset="0"/>
-              <a:buChar char="•"/>
+            <a:endParaRPr lang="en-GB"/>
+          </a:p>
+          <a:p>
+            <a:pPr marL="285750" indent="-285750">
+              <a:buFont typeface="Wingdings"/>
+              <a:buChar char="Ø"/>
             </a:pPr>
             <a:r>
-              <a:rPr lang="en-GB" sz="1400" dirty="0"/>
-              <a:t>→ Ask me to slow down</a:t>
-            </a:r>
-          </a:p>
-          <a:p>
-            <a:pPr>
-              <a:buFont typeface="Arial" panose="020B0604020202020204" pitchFamily="34" charset="0"/>
-              <a:buChar char="•"/>
+              <a:rPr lang="en-GB" sz="1400"/>
+              <a:t>Ask me to slow down</a:t>
+            </a:r>
+            <a:endParaRPr lang="en-GB" sz="1400">
+              <a:ea typeface="Calibri" panose="020F0502020204030204"/>
+              <a:cs typeface="Calibri" panose="020F0502020204030204"/>
+            </a:endParaRPr>
+          </a:p>
+          <a:p>
+            <a:pPr marL="285750" indent="-285750">
+              <a:buFont typeface="Wingdings"/>
+              <a:buChar char="Ø"/>
             </a:pPr>
             <a:r>
-              <a:rPr lang="en-GB" sz="1400" dirty="0"/>
-              <a:t>→ We can pause and recap</a:t>
-            </a:r>
+              <a:rPr lang="en-GB" sz="1400"/>
+              <a:t> We can pause and recap</a:t>
+            </a:r>
+            <a:endParaRPr lang="en-GB" sz="1400">
+              <a:ea typeface="Calibri" panose="020F0502020204030204"/>
+              <a:cs typeface="Calibri" panose="020F0502020204030204"/>
+            </a:endParaRPr>
           </a:p>
         </p:txBody>
       </p:sp>
@@ -3649,36 +3697,44 @@
           </a:ln>
         </p:spPr>
         <p:txBody>
-          <a:bodyPr wrap="square">
+          <a:bodyPr wrap="square" lIns="91440" tIns="45720" rIns="91440" bIns="45720" anchor="t">
             <a:spAutoFit/>
           </a:bodyPr>
           <a:lstStyle/>
           <a:p>
             <a:r>
-              <a:rPr lang="en-GB" b="1" dirty="0"/>
+              <a:rPr lang="en-GB" b="1"/>
               <a:t>The wording is tricky</a:t>
             </a:r>
-            <a:endParaRPr lang="en-GB" dirty="0"/>
-          </a:p>
-          <a:p>
-            <a:pPr>
-              <a:buFont typeface="Arial" panose="020B0604020202020204" pitchFamily="34" charset="0"/>
-              <a:buChar char="•"/>
+            <a:endParaRPr lang="en-GB"/>
+          </a:p>
+          <a:p>
+            <a:pPr marL="285750" indent="-285750">
+              <a:buFont typeface="Wingdings" panose="020B0604020202020204" pitchFamily="34" charset="0"/>
+              <a:buChar char="Ø"/>
             </a:pPr>
             <a:r>
-              <a:rPr lang="en-GB" sz="1400" dirty="0"/>
-              <a:t>→ Ask me to rephrase</a:t>
-            </a:r>
-          </a:p>
-          <a:p>
-            <a:pPr>
-              <a:buFont typeface="Arial" panose="020B0604020202020204" pitchFamily="34" charset="0"/>
-              <a:buChar char="•"/>
+              <a:rPr lang="en-GB" sz="1400"/>
+              <a:t> Ask me to rephrase</a:t>
+            </a:r>
+            <a:endParaRPr lang="en-GB" sz="1400">
+              <a:ea typeface="Calibri" panose="020F0502020204030204"/>
+              <a:cs typeface="Calibri" panose="020F0502020204030204"/>
+            </a:endParaRPr>
+          </a:p>
+          <a:p>
+            <a:pPr marL="285750" indent="-285750">
+              <a:buFont typeface="Wingdings" panose="020B0604020202020204" pitchFamily="34" charset="0"/>
+              <a:buChar char="Ø"/>
             </a:pPr>
             <a:r>
-              <a:rPr lang="en-GB" sz="1400" dirty="0"/>
-              <a:t>→ Real learning happens when we untangle confusing language</a:t>
-            </a:r>
+              <a:rPr lang="en-GB" sz="1400"/>
+              <a:t> Real learning happens when we untangle confusing language</a:t>
+            </a:r>
+            <a:endParaRPr lang="en-GB" sz="1400">
+              <a:ea typeface="Calibri" panose="020F0502020204030204"/>
+              <a:cs typeface="Calibri" panose="020F0502020204030204"/>
+            </a:endParaRPr>
           </a:p>
         </p:txBody>
       </p:sp>
@@ -3710,36 +3766,44 @@
           </a:ln>
         </p:spPr>
         <p:txBody>
-          <a:bodyPr wrap="square">
+          <a:bodyPr wrap="square" lIns="91440" tIns="45720" rIns="91440" bIns="45720" anchor="t">
             <a:spAutoFit/>
           </a:bodyPr>
           <a:lstStyle/>
           <a:p>
             <a:r>
-              <a:rPr lang="en-GB" b="1" dirty="0"/>
+              <a:rPr lang="en-GB" b="1"/>
               <a:t>It seems inconsistent with something before</a:t>
             </a:r>
-            <a:endParaRPr lang="en-GB" dirty="0"/>
-          </a:p>
-          <a:p>
-            <a:pPr>
-              <a:buFont typeface="Arial" panose="020B0604020202020204" pitchFamily="34" charset="0"/>
-              <a:buChar char="•"/>
+            <a:endParaRPr lang="en-GB"/>
+          </a:p>
+          <a:p>
+            <a:pPr marL="285750" indent="-285750">
+              <a:buFont typeface="Wingdings" panose="020B0604020202020204" pitchFamily="34" charset="0"/>
+              <a:buChar char="Ø"/>
             </a:pPr>
             <a:r>
-              <a:rPr lang="en-GB" sz="1400" dirty="0"/>
-              <a:t>→ Excellent opportunity for a question</a:t>
-            </a:r>
-          </a:p>
-          <a:p>
-            <a:pPr>
-              <a:buFont typeface="Arial" panose="020B0604020202020204" pitchFamily="34" charset="0"/>
-              <a:buChar char="•"/>
+              <a:rPr lang="en-GB" sz="1400"/>
+              <a:t>Excellent opportunity for a question</a:t>
+            </a:r>
+            <a:endParaRPr lang="en-GB" sz="1400">
+              <a:ea typeface="Calibri" panose="020F0502020204030204"/>
+              <a:cs typeface="Calibri" panose="020F0502020204030204"/>
+            </a:endParaRPr>
+          </a:p>
+          <a:p>
+            <a:pPr marL="285750" indent="-285750">
+              <a:buFont typeface="Wingdings" panose="020B0604020202020204" pitchFamily="34" charset="0"/>
+              <a:buChar char="Ø"/>
             </a:pPr>
             <a:r>
-              <a:rPr lang="en-GB" sz="1400" dirty="0"/>
-              <a:t>→ You’re spotting connections that I probably haven’t clearly explained</a:t>
-            </a:r>
+              <a:rPr lang="en-GB" sz="1400"/>
+              <a:t>You’re spotting connections that I probably haven’t clearly explained</a:t>
+            </a:r>
+            <a:endParaRPr lang="en-GB" sz="1400">
+              <a:ea typeface="Calibri" panose="020F0502020204030204"/>
+              <a:cs typeface="Calibri" panose="020F0502020204030204"/>
+            </a:endParaRPr>
           </a:p>
         </p:txBody>
       </p:sp>
@@ -3757,8 +3821,8 @@
         </p:nvSpPr>
         <p:spPr>
           <a:xfrm>
-            <a:off x="5107334" y="5755209"/>
-            <a:ext cx="6797059" cy="800219"/>
+            <a:off x="5126625" y="5755209"/>
+            <a:ext cx="7076780" cy="800219"/>
           </a:xfrm>
           <a:prstGeom prst="rect">
             <a:avLst/>
@@ -3771,36 +3835,44 @@
           </a:ln>
         </p:spPr>
         <p:txBody>
-          <a:bodyPr wrap="square">
+          <a:bodyPr wrap="square" lIns="91440" tIns="45720" rIns="91440" bIns="45720" anchor="t">
             <a:spAutoFit/>
           </a:bodyPr>
           <a:lstStyle/>
           <a:p>
             <a:r>
-              <a:rPr lang="en-GB" b="1" dirty="0"/>
+              <a:rPr lang="en-GB" b="1"/>
               <a:t>You’re unsure what’s important</a:t>
             </a:r>
-            <a:endParaRPr lang="en-GB" dirty="0"/>
-          </a:p>
-          <a:p>
-            <a:pPr>
-              <a:buFont typeface="Arial" panose="020B0604020202020204" pitchFamily="34" charset="0"/>
-              <a:buChar char="•"/>
+            <a:endParaRPr lang="en-GB"/>
+          </a:p>
+          <a:p>
+            <a:pPr marL="285750" indent="-285750">
+              <a:buFont typeface="Wingdings" panose="020B0604020202020204" pitchFamily="34" charset="0"/>
+              <a:buChar char="Ø"/>
             </a:pPr>
             <a:r>
-              <a:rPr lang="en-GB" sz="1400" dirty="0"/>
-              <a:t>→ Figuring out the bits to focus on/try to tie together is all part of the learning experience</a:t>
-            </a:r>
-          </a:p>
-          <a:p>
-            <a:pPr>
-              <a:buFont typeface="Arial" panose="020B0604020202020204" pitchFamily="34" charset="0"/>
-              <a:buChar char="•"/>
+              <a:rPr lang="en-GB" sz="1400"/>
+              <a:t> Figuring out the bits to focus on/try to tie together is all part of the learning experience</a:t>
+            </a:r>
+            <a:endParaRPr lang="en-GB" sz="1400">
+              <a:ea typeface="Calibri" panose="020F0502020204030204"/>
+              <a:cs typeface="Calibri" panose="020F0502020204030204"/>
+            </a:endParaRPr>
+          </a:p>
+          <a:p>
+            <a:pPr marL="285750" indent="-285750">
+              <a:buFont typeface="Wingdings" panose="020B0604020202020204" pitchFamily="34" charset="0"/>
+              <a:buChar char="Ø"/>
             </a:pPr>
             <a:r>
-              <a:rPr lang="en-GB" sz="1400" dirty="0"/>
-              <a:t>→ Ask me to highlight the key idea I’m trying to get across</a:t>
-            </a:r>
+              <a:rPr lang="en-GB" sz="1400"/>
+              <a:t> Ask me to highlight the key idea I’m trying to get across</a:t>
+            </a:r>
+            <a:endParaRPr lang="en-GB" sz="1400">
+              <a:ea typeface="Calibri" panose="020F0502020204030204"/>
+              <a:cs typeface="Calibri" panose="020F0502020204030204"/>
+            </a:endParaRPr>
           </a:p>
         </p:txBody>
       </p:sp>
@@ -4006,8 +4078,8 @@
         </p:nvCxnSpPr>
         <p:spPr>
           <a:xfrm flipV="1">
-            <a:off x="1361532" y="451727"/>
-            <a:ext cx="4653231" cy="3149801"/>
+            <a:off x="1361532" y="413145"/>
+            <a:ext cx="4682167" cy="3188383"/>
           </a:xfrm>
           <a:prstGeom prst="straightConnector1">
             <a:avLst/>
@@ -4099,7 +4171,7 @@
         <p:spPr>
           <a:xfrm>
             <a:off x="1361532" y="3601528"/>
-            <a:ext cx="3745802" cy="2553791"/>
+            <a:ext cx="3765093" cy="2553791"/>
           </a:xfrm>
           <a:prstGeom prst="straightConnector1">
             <a:avLst/>
@@ -4140,8 +4212,8 @@
         </p:nvSpPr>
         <p:spPr>
           <a:xfrm>
-            <a:off x="1727842" y="6019541"/>
-            <a:ext cx="2822253" cy="769441"/>
+            <a:off x="1766424" y="6019541"/>
+            <a:ext cx="3092329" cy="769441"/>
           </a:xfrm>
           <a:prstGeom prst="rect">
             <a:avLst/>
@@ -4154,40 +4226,48 @@
           </a:ln>
         </p:spPr>
         <p:txBody>
-          <a:bodyPr wrap="square">
+          <a:bodyPr wrap="square" lIns="91440" tIns="45720" rIns="91440" bIns="45720" anchor="t">
             <a:spAutoFit/>
           </a:bodyPr>
           <a:lstStyle/>
           <a:p>
             <a:r>
-              <a:rPr lang="en-GB" sz="1100" b="1" dirty="0"/>
+              <a:rPr lang="en-GB" sz="1100" b="1"/>
               <a:t>You’re an idiot (</a:t>
             </a:r>
             <a:r>
-              <a:rPr lang="en-GB" sz="1100" b="1" i="1" dirty="0"/>
+              <a:rPr lang="en-GB" sz="1100" b="1" i="1"/>
               <a:t>EXTREMELY UNLIKELY)</a:t>
             </a:r>
-            <a:endParaRPr lang="en-GB" sz="1100" dirty="0"/>
-          </a:p>
-          <a:p>
-            <a:pPr>
-              <a:buFont typeface="Arial" panose="020B0604020202020204" pitchFamily="34" charset="0"/>
-              <a:buChar char="•"/>
+            <a:endParaRPr lang="en-GB" sz="1100"/>
+          </a:p>
+          <a:p>
+            <a:pPr marL="171450" indent="-171450">
+              <a:buFont typeface="Wingdings" panose="020B0604020202020204" pitchFamily="34" charset="0"/>
+              <a:buChar char="Ø"/>
             </a:pPr>
             <a:r>
-              <a:rPr lang="en-GB" sz="1100" dirty="0"/>
-              <a:t>→ No you’re not! There’s no such thing!</a:t>
-            </a:r>
-          </a:p>
-          <a:p>
-            <a:pPr>
-              <a:buFont typeface="Arial" panose="020B0604020202020204" pitchFamily="34" charset="0"/>
-              <a:buChar char="•"/>
+              <a:rPr lang="en-GB" sz="1100"/>
+              <a:t> No you’re not! There’s no such thing!</a:t>
+            </a:r>
+            <a:endParaRPr lang="en-GB" sz="1100">
+              <a:ea typeface="Calibri"/>
+              <a:cs typeface="Calibri"/>
+            </a:endParaRPr>
+          </a:p>
+          <a:p>
+            <a:pPr marL="171450" indent="-171450">
+              <a:buFont typeface="Wingdings" panose="020B0604020202020204" pitchFamily="34" charset="0"/>
+              <a:buChar char="Ø"/>
             </a:pPr>
             <a:r>
-              <a:rPr lang="en-GB" sz="1100" dirty="0"/>
-              <a:t>→ Confusion is to be expected (even desired) when learning. It just means you’re thinking! </a:t>
-            </a:r>
+              <a:rPr lang="en-GB" sz="1100"/>
+              <a:t> Confusion is to be expected (even desired) when learning. It just means you’re thinking! </a:t>
+            </a:r>
+            <a:endParaRPr lang="en-GB" sz="1100">
+              <a:ea typeface="Calibri"/>
+              <a:cs typeface="Calibri"/>
+            </a:endParaRPr>
           </a:p>
         </p:txBody>
       </p:sp>
@@ -4210,7 +4290,7 @@
         <p:spPr>
           <a:xfrm>
             <a:off x="1361532" y="3601528"/>
-            <a:ext cx="366310" cy="2802734"/>
+            <a:ext cx="404892" cy="2802734"/>
           </a:xfrm>
           <a:prstGeom prst="straightConnector1">
             <a:avLst/>
@@ -4252,7 +4332,7 @@
         </p:nvSpPr>
         <p:spPr>
           <a:xfrm>
-            <a:off x="8338767" y="915758"/>
+            <a:off x="7518894" y="954340"/>
             <a:ext cx="991163" cy="307777"/>
           </a:xfrm>
           <a:prstGeom prst="rect">
@@ -4266,14 +4346,14 @@
           </a:ln>
         </p:spPr>
         <p:txBody>
-          <a:bodyPr wrap="square">
+          <a:bodyPr wrap="square" lIns="91440" tIns="45720" rIns="91440" bIns="45720" anchor="t">
             <a:spAutoFit/>
           </a:bodyPr>
           <a:lstStyle/>
           <a:p>
             <a:r>
-              <a:rPr lang="en-GB" sz="1400" dirty="0"/>
-              <a:t>It was me</a:t>
+              <a:rPr lang="en-GB" sz="1400"/>
+              <a:t>me</a:t>
             </a:r>
           </a:p>
         </p:txBody>
@@ -4292,7 +4372,7 @@
         </p:nvSpPr>
         <p:spPr>
           <a:xfrm>
-            <a:off x="8338766" y="1338377"/>
+            <a:off x="7518893" y="1376959"/>
             <a:ext cx="991163" cy="307777"/>
           </a:xfrm>
           <a:prstGeom prst="rect">
@@ -4306,14 +4386,14 @@
           </a:ln>
         </p:spPr>
         <p:txBody>
-          <a:bodyPr wrap="square">
+          <a:bodyPr wrap="square" lIns="91440" tIns="45720" rIns="91440" bIns="45720" anchor="t">
             <a:spAutoFit/>
           </a:bodyPr>
           <a:lstStyle/>
           <a:p>
             <a:r>
-              <a:rPr lang="en-GB" sz="1400" dirty="0"/>
-              <a:t>It was you</a:t>
+              <a:rPr lang="en-GB" sz="1400"/>
+              <a:t>you</a:t>
             </a:r>
           </a:p>
         </p:txBody>
@@ -4336,8 +4416,8 @@
         </p:nvCxnSpPr>
         <p:spPr>
           <a:xfrm flipV="1">
-            <a:off x="1361532" y="1287457"/>
-            <a:ext cx="3859203" cy="2314071"/>
+            <a:off x="1361532" y="1316393"/>
+            <a:ext cx="3888139" cy="2285135"/>
           </a:xfrm>
           <a:prstGeom prst="straightConnector1">
             <a:avLst/>
@@ -4382,8 +4462,8 @@
         </p:nvCxnSpPr>
         <p:spPr>
           <a:xfrm flipV="1">
-            <a:off x="7891828" y="1069647"/>
-            <a:ext cx="446939" cy="217810"/>
+            <a:off x="7023727" y="1108229"/>
+            <a:ext cx="495167" cy="208164"/>
           </a:xfrm>
           <a:prstGeom prst="straightConnector1">
             <a:avLst/>
@@ -4428,8 +4508,8 @@
         </p:nvCxnSpPr>
         <p:spPr>
           <a:xfrm>
-            <a:off x="7891828" y="1287457"/>
-            <a:ext cx="446938" cy="204809"/>
+            <a:off x="7023727" y="1316393"/>
+            <a:ext cx="495166" cy="214455"/>
           </a:xfrm>
           <a:prstGeom prst="straightConnector1">
             <a:avLst/>
@@ -4470,8 +4550,8 @@
         </p:nvSpPr>
         <p:spPr>
           <a:xfrm>
-            <a:off x="5220735" y="1102791"/>
-            <a:ext cx="2671093" cy="369332"/>
+            <a:off x="5249671" y="1131727"/>
+            <a:ext cx="1774056" cy="369332"/>
           </a:xfrm>
           <a:prstGeom prst="rect">
             <a:avLst/>
@@ -4486,16 +4566,19 @@
           </a:ln>
         </p:spPr>
         <p:txBody>
-          <a:bodyPr wrap="square">
+          <a:bodyPr wrap="square" lIns="91440" tIns="45720" rIns="91440" bIns="45720" anchor="t">
             <a:spAutoFit/>
           </a:bodyPr>
           <a:lstStyle/>
           <a:p>
             <a:r>
-              <a:rPr lang="en-GB" b="1" dirty="0"/>
-              <a:t>One of us had a brain fart</a:t>
-            </a:r>
-            <a:endParaRPr lang="en-GB" dirty="0"/>
+              <a:rPr lang="en-GB" b="1"/>
+              <a:t>Brain says no</a:t>
+            </a:r>
+            <a:endParaRPr lang="en-GB" b="1">
+              <a:ea typeface="Calibri"/>
+              <a:cs typeface="Calibri"/>
+            </a:endParaRPr>
           </a:p>
         </p:txBody>
       </p:sp>
@@ -4581,14 +4664,14 @@
           <a:lstStyle/>
           <a:p>
             <a:r>
-              <a:rPr lang="en-GB" sz="1400" b="1" dirty="0">
+              <a:rPr lang="en-GB" sz="1400" b="1">
                 <a:solidFill>
                   <a:srgbClr val="00FF00"/>
                 </a:solidFill>
               </a:rPr>
               <a:t>glitch in the matrix</a:t>
             </a:r>
-            <a:endParaRPr lang="en-GB" sz="1400" dirty="0">
+            <a:endParaRPr lang="en-GB" sz="1400">
               <a:solidFill>
                 <a:srgbClr val="00FF00"/>
               </a:solidFill>
@@ -4647,7 +4730,7 @@
           <a:p>
             <a:pPr algn="ctr"/>
             <a:r>
-              <a:rPr lang="en-GB" dirty="0">
+              <a:rPr lang="en-GB">
                 <a:solidFill>
                   <a:schemeClr val="tx1"/>
                 </a:solidFill>

</xml_diff>